<commit_message>
FINAL CORRECTIONS IN ALL PLOTS + SEARCHES + MORE
</commit_message>
<xml_diff>
--- a/Writing/Thesis_Figures/Bimetal_Combs_3and7.pptx
+++ b/Writing/Thesis_Figures/Bimetal_Combs_3and7.pptx
@@ -104,6 +104,11 @@
       </a:defRPr>
     </a:lvl9pPr>
   </p:defaultTextStyle>
+  <p:extLst>
+    <p:ext uri="{EFAFB233-063F-42B5-8137-9DF3F51BA10A}">
+      <p15:sldGuideLst xmlns:p15="http://schemas.microsoft.com/office/powerpoint/2012/main"/>
+    </p:ext>
+  </p:extLst>
 </p:presentation>
 </file>
 
@@ -238,7 +243,7 @@
           <a:p>
             <a:fld id="{949040F9-E478-B741-B696-826DF3A210E9}" type="datetimeFigureOut">
               <a:rPr lang="da-DK" smtClean="0"/>
-              <a:t>14.10.2023</a:t>
+              <a:t>17.10.2023</a:t>
             </a:fld>
             <a:endParaRPr lang="da-DK"/>
           </a:p>
@@ -408,7 +413,7 @@
           <a:p>
             <a:fld id="{949040F9-E478-B741-B696-826DF3A210E9}" type="datetimeFigureOut">
               <a:rPr lang="da-DK" smtClean="0"/>
-              <a:t>14.10.2023</a:t>
+              <a:t>17.10.2023</a:t>
             </a:fld>
             <a:endParaRPr lang="da-DK"/>
           </a:p>
@@ -588,7 +593,7 @@
           <a:p>
             <a:fld id="{949040F9-E478-B741-B696-826DF3A210E9}" type="datetimeFigureOut">
               <a:rPr lang="da-DK" smtClean="0"/>
-              <a:t>14.10.2023</a:t>
+              <a:t>17.10.2023</a:t>
             </a:fld>
             <a:endParaRPr lang="da-DK"/>
           </a:p>
@@ -758,7 +763,7 @@
           <a:p>
             <a:fld id="{949040F9-E478-B741-B696-826DF3A210E9}" type="datetimeFigureOut">
               <a:rPr lang="da-DK" smtClean="0"/>
-              <a:t>14.10.2023</a:t>
+              <a:t>17.10.2023</a:t>
             </a:fld>
             <a:endParaRPr lang="da-DK"/>
           </a:p>
@@ -1004,7 +1009,7 @@
           <a:p>
             <a:fld id="{949040F9-E478-B741-B696-826DF3A210E9}" type="datetimeFigureOut">
               <a:rPr lang="da-DK" smtClean="0"/>
-              <a:t>14.10.2023</a:t>
+              <a:t>17.10.2023</a:t>
             </a:fld>
             <a:endParaRPr lang="da-DK"/>
           </a:p>
@@ -1236,7 +1241,7 @@
           <a:p>
             <a:fld id="{949040F9-E478-B741-B696-826DF3A210E9}" type="datetimeFigureOut">
               <a:rPr lang="da-DK" smtClean="0"/>
-              <a:t>14.10.2023</a:t>
+              <a:t>17.10.2023</a:t>
             </a:fld>
             <a:endParaRPr lang="da-DK"/>
           </a:p>
@@ -1603,7 +1608,7 @@
           <a:p>
             <a:fld id="{949040F9-E478-B741-B696-826DF3A210E9}" type="datetimeFigureOut">
               <a:rPr lang="da-DK" smtClean="0"/>
-              <a:t>14.10.2023</a:t>
+              <a:t>17.10.2023</a:t>
             </a:fld>
             <a:endParaRPr lang="da-DK"/>
           </a:p>
@@ -1721,7 +1726,7 @@
           <a:p>
             <a:fld id="{949040F9-E478-B741-B696-826DF3A210E9}" type="datetimeFigureOut">
               <a:rPr lang="da-DK" smtClean="0"/>
-              <a:t>14.10.2023</a:t>
+              <a:t>17.10.2023</a:t>
             </a:fld>
             <a:endParaRPr lang="da-DK"/>
           </a:p>
@@ -1816,7 +1821,7 @@
           <a:p>
             <a:fld id="{949040F9-E478-B741-B696-826DF3A210E9}" type="datetimeFigureOut">
               <a:rPr lang="da-DK" smtClean="0"/>
-              <a:t>14.10.2023</a:t>
+              <a:t>17.10.2023</a:t>
             </a:fld>
             <a:endParaRPr lang="da-DK"/>
           </a:p>
@@ -2093,7 +2098,7 @@
           <a:p>
             <a:fld id="{949040F9-E478-B741-B696-826DF3A210E9}" type="datetimeFigureOut">
               <a:rPr lang="da-DK" smtClean="0"/>
-              <a:t>14.10.2023</a:t>
+              <a:t>17.10.2023</a:t>
             </a:fld>
             <a:endParaRPr lang="da-DK"/>
           </a:p>
@@ -2350,7 +2355,7 @@
           <a:p>
             <a:fld id="{949040F9-E478-B741-B696-826DF3A210E9}" type="datetimeFigureOut">
               <a:rPr lang="da-DK" smtClean="0"/>
-              <a:t>14.10.2023</a:t>
+              <a:t>17.10.2023</a:t>
             </a:fld>
             <a:endParaRPr lang="da-DK"/>
           </a:p>
@@ -2563,7 +2568,7 @@
           <a:p>
             <a:fld id="{949040F9-E478-B741-B696-826DF3A210E9}" type="datetimeFigureOut">
               <a:rPr lang="da-DK" smtClean="0"/>
-              <a:t>14.10.2023</a:t>
+              <a:t>17.10.2023</a:t>
             </a:fld>
             <a:endParaRPr lang="da-DK"/>
           </a:p>
@@ -2970,7 +2975,7 @@
       </p:grpSpPr>
       <p:pic>
         <p:nvPicPr>
-          <p:cNvPr id="5" name="Picture 4" descr="A graph of a graph showing different types of objects&#10;&#10;Description automatically generated with medium confidence">
+          <p:cNvPr id="5" name="Picture 4">
             <a:extLst>
               <a:ext uri="{FF2B5EF4-FFF2-40B4-BE49-F238E27FC236}">
                 <a16:creationId xmlns:a16="http://schemas.microsoft.com/office/drawing/2014/main" id="{03D689F0-3051-EA52-16C7-AF0EBAC8116C}"/>
@@ -2984,14 +2989,13 @@
         </p:nvPicPr>
         <p:blipFill>
           <a:blip r:embed="rId2"/>
-          <a:stretch>
-            <a:fillRect/>
-          </a:stretch>
+          <a:srcRect/>
+          <a:stretch/>
         </p:blipFill>
         <p:spPr>
           <a:xfrm>
             <a:off x="0" y="0"/>
-            <a:ext cx="3715053" cy="3600450"/>
+            <a:ext cx="3715053" cy="3600449"/>
           </a:xfrm>
           <a:prstGeom prst="rect">
             <a:avLst/>
@@ -3000,7 +3004,7 @@
       </p:pic>
       <p:pic>
         <p:nvPicPr>
-          <p:cNvPr id="7" name="Picture 6" descr="A graph showing different colored shapes&#10;&#10;Description automatically generated with medium confidence">
+          <p:cNvPr id="7" name="Picture 6">
             <a:extLst>
               <a:ext uri="{FF2B5EF4-FFF2-40B4-BE49-F238E27FC236}">
                 <a16:creationId xmlns:a16="http://schemas.microsoft.com/office/drawing/2014/main" id="{E20339E6-85D8-5805-3AC6-91FF69CEEFE1}"/>
@@ -3014,14 +3018,13 @@
         </p:nvPicPr>
         <p:blipFill>
           <a:blip r:embed="rId3"/>
-          <a:stretch>
-            <a:fillRect/>
-          </a:stretch>
+          <a:srcRect/>
+          <a:stretch/>
         </p:blipFill>
         <p:spPr>
           <a:xfrm>
             <a:off x="3844623" y="0"/>
-            <a:ext cx="3715053" cy="3600450"/>
+            <a:ext cx="3715053" cy="3600449"/>
           </a:xfrm>
           <a:prstGeom prst="rect">
             <a:avLst/>

</xml_diff>

<commit_message>
Final plots fixed, conclusion kinda done, all references done
</commit_message>
<xml_diff>
--- a/Writing/Thesis_Figures/Bimetal_Combs_3and7.pptx
+++ b/Writing/Thesis_Figures/Bimetal_Combs_3and7.pptx
@@ -243,7 +243,7 @@
           <a:p>
             <a:fld id="{949040F9-E478-B741-B696-826DF3A210E9}" type="datetimeFigureOut">
               <a:rPr lang="da-DK" smtClean="0"/>
-              <a:t>17.10.2023</a:t>
+              <a:t>29.10.2023</a:t>
             </a:fld>
             <a:endParaRPr lang="da-DK"/>
           </a:p>
@@ -413,7 +413,7 @@
           <a:p>
             <a:fld id="{949040F9-E478-B741-B696-826DF3A210E9}" type="datetimeFigureOut">
               <a:rPr lang="da-DK" smtClean="0"/>
-              <a:t>17.10.2023</a:t>
+              <a:t>29.10.2023</a:t>
             </a:fld>
             <a:endParaRPr lang="da-DK"/>
           </a:p>
@@ -593,7 +593,7 @@
           <a:p>
             <a:fld id="{949040F9-E478-B741-B696-826DF3A210E9}" type="datetimeFigureOut">
               <a:rPr lang="da-DK" smtClean="0"/>
-              <a:t>17.10.2023</a:t>
+              <a:t>29.10.2023</a:t>
             </a:fld>
             <a:endParaRPr lang="da-DK"/>
           </a:p>
@@ -763,7 +763,7 @@
           <a:p>
             <a:fld id="{949040F9-E478-B741-B696-826DF3A210E9}" type="datetimeFigureOut">
               <a:rPr lang="da-DK" smtClean="0"/>
-              <a:t>17.10.2023</a:t>
+              <a:t>29.10.2023</a:t>
             </a:fld>
             <a:endParaRPr lang="da-DK"/>
           </a:p>
@@ -1009,7 +1009,7 @@
           <a:p>
             <a:fld id="{949040F9-E478-B741-B696-826DF3A210E9}" type="datetimeFigureOut">
               <a:rPr lang="da-DK" smtClean="0"/>
-              <a:t>17.10.2023</a:t>
+              <a:t>29.10.2023</a:t>
             </a:fld>
             <a:endParaRPr lang="da-DK"/>
           </a:p>
@@ -1241,7 +1241,7 @@
           <a:p>
             <a:fld id="{949040F9-E478-B741-B696-826DF3A210E9}" type="datetimeFigureOut">
               <a:rPr lang="da-DK" smtClean="0"/>
-              <a:t>17.10.2023</a:t>
+              <a:t>29.10.2023</a:t>
             </a:fld>
             <a:endParaRPr lang="da-DK"/>
           </a:p>
@@ -1608,7 +1608,7 @@
           <a:p>
             <a:fld id="{949040F9-E478-B741-B696-826DF3A210E9}" type="datetimeFigureOut">
               <a:rPr lang="da-DK" smtClean="0"/>
-              <a:t>17.10.2023</a:t>
+              <a:t>29.10.2023</a:t>
             </a:fld>
             <a:endParaRPr lang="da-DK"/>
           </a:p>
@@ -1726,7 +1726,7 @@
           <a:p>
             <a:fld id="{949040F9-E478-B741-B696-826DF3A210E9}" type="datetimeFigureOut">
               <a:rPr lang="da-DK" smtClean="0"/>
-              <a:t>17.10.2023</a:t>
+              <a:t>29.10.2023</a:t>
             </a:fld>
             <a:endParaRPr lang="da-DK"/>
           </a:p>
@@ -1821,7 +1821,7 @@
           <a:p>
             <a:fld id="{949040F9-E478-B741-B696-826DF3A210E9}" type="datetimeFigureOut">
               <a:rPr lang="da-DK" smtClean="0"/>
-              <a:t>17.10.2023</a:t>
+              <a:t>29.10.2023</a:t>
             </a:fld>
             <a:endParaRPr lang="da-DK"/>
           </a:p>
@@ -2098,7 +2098,7 @@
           <a:p>
             <a:fld id="{949040F9-E478-B741-B696-826DF3A210E9}" type="datetimeFigureOut">
               <a:rPr lang="da-DK" smtClean="0"/>
-              <a:t>17.10.2023</a:t>
+              <a:t>29.10.2023</a:t>
             </a:fld>
             <a:endParaRPr lang="da-DK"/>
           </a:p>
@@ -2355,7 +2355,7 @@
           <a:p>
             <a:fld id="{949040F9-E478-B741-B696-826DF3A210E9}" type="datetimeFigureOut">
               <a:rPr lang="da-DK" smtClean="0"/>
-              <a:t>17.10.2023</a:t>
+              <a:t>29.10.2023</a:t>
             </a:fld>
             <a:endParaRPr lang="da-DK"/>
           </a:p>
@@ -2568,7 +2568,7 @@
           <a:p>
             <a:fld id="{949040F9-E478-B741-B696-826DF3A210E9}" type="datetimeFigureOut">
               <a:rPr lang="da-DK" smtClean="0"/>
-              <a:t>17.10.2023</a:t>
+              <a:t>29.10.2023</a:t>
             </a:fld>
             <a:endParaRPr lang="da-DK"/>
           </a:p>
@@ -2995,7 +2995,7 @@
         <p:spPr>
           <a:xfrm>
             <a:off x="0" y="0"/>
-            <a:ext cx="3715053" cy="3600449"/>
+            <a:ext cx="3715052" cy="3600449"/>
           </a:xfrm>
           <a:prstGeom prst="rect">
             <a:avLst/>
@@ -3024,7 +3024,7 @@
         <p:spPr>
           <a:xfrm>
             <a:off x="3844623" y="0"/>
-            <a:ext cx="3715053" cy="3600449"/>
+            <a:ext cx="3715052" cy="3600449"/>
           </a:xfrm>
           <a:prstGeom prst="rect">
             <a:avLst/>

</xml_diff>